<commit_message>
Add Instagram template files and brown bird asset
New files:
- sova-instagram-templates.pptx (final version with movable birds)
- blank_template_light_large_bird.png (light background with large brown bird)
- create-instagram-slides-v2.js (PowerPoint generation script)
- sova-logo-icon-brown-transparent.png (brown bird icon)

Removed temp PowerPoint lock file.

🤖 Generated with [Claude Code](https://claude.com/claude-code)

Co-Authored-By: Claude <noreply@anthropic.com>
</commit_message>
<xml_diff>
--- a/instagram-templates/sova-instagram-templates.pptx
+++ b/instagram-templates/sova-instagram-templates.pptx
@@ -5,13 +5,15 @@
     <p:sldMasterId id="2147483648" r:id="rId1"/>
   </p:sldMasterIdLst>
   <p:notesMasterIdLst>
-    <p:notesMasterId r:id="rId6"/>
+    <p:notesMasterId r:id="rId8"/>
   </p:notesMasterIdLst>
   <p:sldIdLst>
     <p:sldId id="256" r:id="rId2"/>
     <p:sldId id="257" r:id="rId3"/>
-    <p:sldId id="258" r:id="rId4"/>
+    <p:sldId id="260" r:id="rId4"/>
     <p:sldId id="259" r:id="rId5"/>
+    <p:sldId id="258" r:id="rId6"/>
+    <p:sldId id="262" r:id="rId7"/>
   </p:sldIdLst>
   <p:sldSz cx="9144000" cy="9144000"/>
   <p:notesSz cx="9144000" cy="9144000"/>
@@ -140,7 +142,7 @@
     </p:spTree>
     <p:extLst>
       <p:ext uri="{BB962C8B-B14F-4D97-AF65-F5344CB8AC3E}">
-        <p14:creationId xmlns:p14="http://schemas.microsoft.com/office/powerpoint/2010/main" val="2785300867"/>
+        <p14:creationId xmlns:p14="http://schemas.microsoft.com/office/powerpoint/2010/main" val="3337641168"/>
       </p:ext>
     </p:extLst>
   </p:cSld>
@@ -295,7 +297,11 @@
    - Brown: #2d2828 (for light backgrounds)
    - Sage: #b8d78f (accent)
    - Cream: #f5f5dc
-4. Recommended fonts: Outfit, Arial, or Helvetica</a:t>
+4. Recommended font: Montserrat
+To export as 1080x1080px image:
+1. File &gt; Export &gt; Change File Type &gt; PNG
+2. Choose "Just This One" for current slide
+3. Image will be 1080x1080px, ready for Instagram!</a:t>
             </a:r>
           </a:p>
         </p:txBody>
@@ -391,7 +397,11 @@
    - Brown: #2d2828 (for light backgrounds)
    - Sage: #b8d78f (accent)
    - Cream: #f5f5dc
-4. Recommended fonts: Outfit, Arial, or Helvetica</a:t>
+4. Recommended font: Montserrat
+To export as 1080x1080px image:
+1. File &gt; Export &gt; Change File Type &gt; PNG
+2. Choose "Just This One" for current slide
+3. Image will be 1080x1080px, ready for Instagram!</a:t>
             </a:r>
           </a:p>
         </p:txBody>
@@ -437,7 +447,13 @@
   <p:cSld>
     <p:spTree>
       <p:nvGrpSpPr>
-        <p:cNvPr id="1" name=""/>
+        <p:cNvPr id="1" name="">
+          <a:extLst>
+            <a:ext uri="{FF2B5EF4-FFF2-40B4-BE49-F238E27FC236}">
+              <a16:creationId xmlns:a16="http://schemas.microsoft.com/office/drawing/2014/main" id="{92B390A5-6DB4-AFAE-D705-EB3589551A39}"/>
+            </a:ext>
+          </a:extLst>
+        </p:cNvPr>
         <p:cNvGrpSpPr/>
         <p:nvPr/>
       </p:nvGrpSpPr>
@@ -451,7 +467,13 @@
       </p:grpSpPr>
       <p:sp>
         <p:nvSpPr>
-          <p:cNvPr id="2" name="Slide Image Placeholder 1"/>
+          <p:cNvPr id="2" name="Slide Image Placeholder 1">
+            <a:extLst>
+              <a:ext uri="{FF2B5EF4-FFF2-40B4-BE49-F238E27FC236}">
+                <a16:creationId xmlns:a16="http://schemas.microsoft.com/office/drawing/2014/main" id="{47964533-420C-A12C-F214-1CCD6E48BA4F}"/>
+              </a:ext>
+            </a:extLst>
+          </p:cNvPr>
           <p:cNvSpPr>
             <a:spLocks noGrp="1" noRot="1" noChangeAspect="1"/>
           </p:cNvSpPr>
@@ -463,7 +485,13 @@
       </p:sp>
       <p:sp>
         <p:nvSpPr>
-          <p:cNvPr id="3" name="Notes Placeholder 2"/>
+          <p:cNvPr id="3" name="Notes Placeholder 2">
+            <a:extLst>
+              <a:ext uri="{FF2B5EF4-FFF2-40B4-BE49-F238E27FC236}">
+                <a16:creationId xmlns:a16="http://schemas.microsoft.com/office/drawing/2014/main" id="{ED3BBC3B-2DFF-585D-E510-733D27CED599}"/>
+              </a:ext>
+            </a:extLst>
+          </p:cNvPr>
           <p:cNvSpPr>
             <a:spLocks noGrp="1"/>
           </p:cNvSpPr>
@@ -478,7 +506,7 @@
           <a:p>
             <a:r>
               <a:rPr lang="en-US" dirty="0"/>
-              <a:t>Template 3: Dark - Bird Watermark
+              <a:t>Template 1: Dark - Full Logo &amp; Lines
 To add text:
 1. Insert &gt; Text Box
 2. Type your content
@@ -487,14 +515,24 @@
    - Brown: #2d2828 (for light backgrounds)
    - Sage: #b8d78f (accent)
    - Cream: #f5f5dc
-4. Recommended fonts: Outfit, Arial, or Helvetica</a:t>
+4. Recommended font: Montserrat
+To export as 1080x1080px image:
+1. File &gt; Export &gt; Change File Type &gt; PNG
+2. Choose "Just This One" for current slide
+3. Image will be 1080x1080px, ready for Instagram!</a:t>
             </a:r>
           </a:p>
         </p:txBody>
       </p:sp>
       <p:sp>
         <p:nvSpPr>
-          <p:cNvPr id="4" name="Slide Number Placeholder 3"/>
+          <p:cNvPr id="4" name="Slide Number Placeholder 3">
+            <a:extLst>
+              <a:ext uri="{FF2B5EF4-FFF2-40B4-BE49-F238E27FC236}">
+                <a16:creationId xmlns:a16="http://schemas.microsoft.com/office/drawing/2014/main" id="{1E5297B9-B5AA-A7B5-76E7-BF0E6A1160F9}"/>
+              </a:ext>
+            </a:extLst>
+          </p:cNvPr>
           <p:cNvSpPr>
             <a:spLocks noGrp="1"/>
           </p:cNvSpPr>
@@ -518,7 +556,7 @@
     </p:spTree>
     <p:extLst>
       <p:ext uri="{BB962C8B-B14F-4D97-AF65-F5344CB8AC3E}">
-        <p14:creationId xmlns:p14="http://schemas.microsoft.com/office/powerpoint/2010/main" val="1024086991"/>
+        <p14:creationId xmlns:p14="http://schemas.microsoft.com/office/powerpoint/2010/main" val="2981913282"/>
       </p:ext>
     </p:extLst>
   </p:cSld>
@@ -574,7 +612,7 @@
           <a:p>
             <a:r>
               <a:rPr lang="en-US" dirty="0"/>
-              <a:t>Template 4: Light - Bird Watermark
+              <a:t>Template 4: Light - Large Bird Watermark (Brown)
 To add text:
 1. Insert &gt; Text Box
 2. Type your content
@@ -583,7 +621,11 @@
    - Brown: #2d2828 (for light backgrounds)
    - Sage: #b8d78f (accent)
    - Cream: #f5f5dc
-4. Recommended fonts: Outfit, Arial, or Helvetica</a:t>
+4. Recommended font: Montserrat
+To export as 1080x1080px image:
+1. File &gt; Export &gt; Change File Type &gt; PNG
+2. Choose "Just This One" for current slide
+3. Image will be 1080x1080px, ready for Instagram!</a:t>
             </a:r>
           </a:p>
         </p:txBody>
@@ -615,6 +657,230 @@
     <p:extLst>
       <p:ext uri="{BB962C8B-B14F-4D97-AF65-F5344CB8AC3E}">
         <p14:creationId xmlns:p14="http://schemas.microsoft.com/office/powerpoint/2010/main" val="1024086991"/>
+      </p:ext>
+    </p:extLst>
+  </p:cSld>
+  <p:clrMapOvr>
+    <a:masterClrMapping/>
+  </p:clrMapOvr>
+</p:notes>
+</file>
+
+<file path=ppt/notesSlides/notesSlide5.xml><?xml version="1.0" encoding="utf-8"?>
+<p:notes xmlns:a="http://schemas.openxmlformats.org/drawingml/2006/main" xmlns:r="http://schemas.openxmlformats.org/officeDocument/2006/relationships" xmlns:p="http://schemas.openxmlformats.org/presentationml/2006/main">
+  <p:cSld>
+    <p:spTree>
+      <p:nvGrpSpPr>
+        <p:cNvPr id="1" name=""/>
+        <p:cNvGrpSpPr/>
+        <p:nvPr/>
+      </p:nvGrpSpPr>
+      <p:grpSpPr>
+        <a:xfrm>
+          <a:off x="0" y="0"/>
+          <a:ext cx="0" cy="0"/>
+          <a:chOff x="0" y="0"/>
+          <a:chExt cx="0" cy="0"/>
+        </a:xfrm>
+      </p:grpSpPr>
+      <p:sp>
+        <p:nvSpPr>
+          <p:cNvPr id="2" name="Slide Image Placeholder 1"/>
+          <p:cNvSpPr>
+            <a:spLocks noGrp="1" noRot="1" noChangeAspect="1"/>
+          </p:cNvSpPr>
+          <p:nvPr>
+            <p:ph type="sldImg"/>
+          </p:nvPr>
+        </p:nvSpPr>
+        <p:spPr/>
+      </p:sp>
+      <p:sp>
+        <p:nvSpPr>
+          <p:cNvPr id="3" name="Notes Placeholder 2"/>
+          <p:cNvSpPr>
+            <a:spLocks noGrp="1"/>
+          </p:cNvSpPr>
+          <p:nvPr>
+            <p:ph type="body" idx="1"/>
+          </p:nvPr>
+        </p:nvSpPr>
+        <p:spPr/>
+        <p:txBody>
+          <a:bodyPr/>
+          <a:lstStyle/>
+          <a:p>
+            <a:r>
+              <a:rPr lang="en-US" dirty="0"/>
+              <a:t>Template 3: Dark - Large Bird Watermark
+To add text:
+1. Insert &gt; Text Box
+2. Type your content
+3. Format using Sova brand colors:
+   - Light green: #eaffc4 (for dark backgrounds)
+   - Brown: #2d2828 (for light backgrounds)
+   - Sage: #b8d78f (accent)
+   - Cream: #f5f5dc
+4. Recommended font: Montserrat
+To export as 1080x1080px image:
+1. File &gt; Export &gt; Change File Type &gt; PNG
+2. Choose "Just This One" for current slide
+3. Image will be 1080x1080px, ready for Instagram!</a:t>
+            </a:r>
+          </a:p>
+        </p:txBody>
+      </p:sp>
+      <p:sp>
+        <p:nvSpPr>
+          <p:cNvPr id="4" name="Slide Number Placeholder 3"/>
+          <p:cNvSpPr>
+            <a:spLocks noGrp="1"/>
+          </p:cNvSpPr>
+          <p:nvPr>
+            <p:ph type="sldNum" sz="quarter" idx="10"/>
+          </p:nvPr>
+        </p:nvSpPr>
+        <p:spPr/>
+        <p:txBody>
+          <a:bodyPr/>
+          <a:lstStyle/>
+          <a:p>
+            <a:fld id="{F7021451-1387-4CA6-816F-3879F97B5CBC}" type="slidenum">
+              <a:rPr lang="en-US"/>
+              <a:t>5</a:t>
+            </a:fld>
+            <a:endParaRPr lang="en-US"/>
+          </a:p>
+        </p:txBody>
+      </p:sp>
+    </p:spTree>
+    <p:extLst>
+      <p:ext uri="{BB962C8B-B14F-4D97-AF65-F5344CB8AC3E}">
+        <p14:creationId xmlns:p14="http://schemas.microsoft.com/office/powerpoint/2010/main" val="1024086991"/>
+      </p:ext>
+    </p:extLst>
+  </p:cSld>
+  <p:clrMapOvr>
+    <a:masterClrMapping/>
+  </p:clrMapOvr>
+</p:notes>
+</file>
+
+<file path=ppt/notesSlides/notesSlide6.xml><?xml version="1.0" encoding="utf-8"?>
+<p:notes xmlns:a="http://schemas.openxmlformats.org/drawingml/2006/main" xmlns:r="http://schemas.openxmlformats.org/officeDocument/2006/relationships" xmlns:p="http://schemas.openxmlformats.org/presentationml/2006/main">
+  <p:cSld>
+    <p:spTree>
+      <p:nvGrpSpPr>
+        <p:cNvPr id="1" name="">
+          <a:extLst>
+            <a:ext uri="{FF2B5EF4-FFF2-40B4-BE49-F238E27FC236}">
+              <a16:creationId xmlns:a16="http://schemas.microsoft.com/office/drawing/2014/main" id="{45C8CF26-7DE7-8176-504C-3EF5611F59BC}"/>
+            </a:ext>
+          </a:extLst>
+        </p:cNvPr>
+        <p:cNvGrpSpPr/>
+        <p:nvPr/>
+      </p:nvGrpSpPr>
+      <p:grpSpPr>
+        <a:xfrm>
+          <a:off x="0" y="0"/>
+          <a:ext cx="0" cy="0"/>
+          <a:chOff x="0" y="0"/>
+          <a:chExt cx="0" cy="0"/>
+        </a:xfrm>
+      </p:grpSpPr>
+      <p:sp>
+        <p:nvSpPr>
+          <p:cNvPr id="2" name="Slide Image Placeholder 1">
+            <a:extLst>
+              <a:ext uri="{FF2B5EF4-FFF2-40B4-BE49-F238E27FC236}">
+                <a16:creationId xmlns:a16="http://schemas.microsoft.com/office/drawing/2014/main" id="{55A8A10A-7879-9524-90E4-C21FB82B86CC}"/>
+              </a:ext>
+            </a:extLst>
+          </p:cNvPr>
+          <p:cNvSpPr>
+            <a:spLocks noGrp="1" noRot="1" noChangeAspect="1"/>
+          </p:cNvSpPr>
+          <p:nvPr>
+            <p:ph type="sldImg"/>
+          </p:nvPr>
+        </p:nvSpPr>
+        <p:spPr/>
+      </p:sp>
+      <p:sp>
+        <p:nvSpPr>
+          <p:cNvPr id="3" name="Notes Placeholder 2">
+            <a:extLst>
+              <a:ext uri="{FF2B5EF4-FFF2-40B4-BE49-F238E27FC236}">
+                <a16:creationId xmlns:a16="http://schemas.microsoft.com/office/drawing/2014/main" id="{5994BB30-0395-F703-7595-2B7DEC9CF858}"/>
+              </a:ext>
+            </a:extLst>
+          </p:cNvPr>
+          <p:cNvSpPr>
+            <a:spLocks noGrp="1"/>
+          </p:cNvSpPr>
+          <p:nvPr>
+            <p:ph type="body" idx="1"/>
+          </p:nvPr>
+        </p:nvSpPr>
+        <p:spPr/>
+        <p:txBody>
+          <a:bodyPr/>
+          <a:lstStyle/>
+          <a:p>
+            <a:r>
+              <a:rPr lang="en-US" dirty="0"/>
+              <a:t>Template 4: Light - Large Bird Watermark (Brown)
+To add text:
+1. Insert &gt; Text Box
+2. Type your content
+3. Format using Sova brand colors:
+   - Light green: #eaffc4 (for dark backgrounds)
+   - Brown: #2d2828 (for light backgrounds)
+   - Sage: #b8d78f (accent)
+   - Cream: #f5f5dc
+4. Recommended font: Montserrat
+To export as 1080x1080px image:
+1. File &gt; Export &gt; Change File Type &gt; PNG
+2. Choose "Just This One" for current slide
+3. Image will be 1080x1080px, ready for Instagram!</a:t>
+            </a:r>
+          </a:p>
+        </p:txBody>
+      </p:sp>
+      <p:sp>
+        <p:nvSpPr>
+          <p:cNvPr id="4" name="Slide Number Placeholder 3">
+            <a:extLst>
+              <a:ext uri="{FF2B5EF4-FFF2-40B4-BE49-F238E27FC236}">
+                <a16:creationId xmlns:a16="http://schemas.microsoft.com/office/drawing/2014/main" id="{6A75B34B-65A1-0138-6543-E161BB31FDD8}"/>
+              </a:ext>
+            </a:extLst>
+          </p:cNvPr>
+          <p:cNvSpPr>
+            <a:spLocks noGrp="1"/>
+          </p:cNvSpPr>
+          <p:nvPr>
+            <p:ph type="sldNum" sz="quarter" idx="10"/>
+          </p:nvPr>
+        </p:nvSpPr>
+        <p:spPr/>
+        <p:txBody>
+          <a:bodyPr/>
+          <a:lstStyle/>
+          <a:p>
+            <a:fld id="{F7021451-1387-4CA6-816F-3879F97B5CBC}" type="slidenum">
+              <a:rPr lang="en-US"/>
+              <a:t>6</a:t>
+            </a:fld>
+            <a:endParaRPr lang="en-US"/>
+          </a:p>
+        </p:txBody>
+      </p:sp>
+    </p:spTree>
+    <p:extLst>
+      <p:ext uri="{BB962C8B-B14F-4D97-AF65-F5344CB8AC3E}">
+        <p14:creationId xmlns:p14="http://schemas.microsoft.com/office/powerpoint/2010/main" val="3518941445"/>
       </p:ext>
     </p:extLst>
   </p:cSld>
@@ -979,10 +1245,10 @@
       </p:pic>
       <p:sp>
         <p:nvSpPr>
-          <p:cNvPr id="3" name="TextBox 2">
+          <p:cNvPr id="6" name="TextBox 5">
             <a:extLst>
               <a:ext uri="{FF2B5EF4-FFF2-40B4-BE49-F238E27FC236}">
-                <a16:creationId xmlns:a16="http://schemas.microsoft.com/office/drawing/2014/main" id="{B64AE584-5481-52E0-1C15-1AC21BBC3ED7}"/>
+                <a16:creationId xmlns:a16="http://schemas.microsoft.com/office/drawing/2014/main" id="{E3313086-0EFF-6D29-6963-C31327A6748E}"/>
               </a:ext>
             </a:extLst>
           </p:cNvPr>
@@ -991,8 +1257,8 @@
         </p:nvSpPr>
         <p:spPr>
           <a:xfrm>
-            <a:off x="1009935" y="2276605"/>
-            <a:ext cx="7219666" cy="3724096"/>
+            <a:off x="2146852" y="2063621"/>
+            <a:ext cx="4717774" cy="5016758"/>
           </a:xfrm>
           <a:prstGeom prst="rect">
             <a:avLst/>
@@ -1005,22 +1271,20 @@
           </a:bodyPr>
           <a:lstStyle/>
           <a:p>
-            <a:pPr algn="just"/>
             <a:r>
-              <a:rPr lang="en-US" sz="4000" dirty="0">
+              <a:rPr lang="en-US" sz="3600" dirty="0">
                 <a:solidFill>
-                  <a:srgbClr val="EAFFC4"/>
+                  <a:srgbClr val="E1FEC2"/>
                 </a:solidFill>
                 <a:latin typeface="Montserrat" pitchFamily="2" charset="0"/>
               </a:rPr>
-              <a:t>In Australia, nearly 450,000 businesses are registered annually.</a:t>
+              <a:t>In Australia, nearly 450,000 businesses are registered annually but one in five close in their first year and 60% within three. </a:t>
             </a:r>
           </a:p>
           <a:p>
-            <a:pPr algn="just"/>
-            <a:endParaRPr lang="en-US" sz="4000" dirty="0">
+            <a:endParaRPr lang="en-US" sz="3600" dirty="0">
               <a:solidFill>
-                <a:srgbClr val="EAFFC4"/>
+                <a:srgbClr val="E1FEC2"/>
               </a:solidFill>
               <a:latin typeface="Montserrat" pitchFamily="2" charset="0"/>
             </a:endParaRPr>
@@ -1028,47 +1292,17 @@
           <a:p>
             <a:pPr algn="r"/>
             <a:r>
-              <a:rPr lang="en-US" sz="4000" dirty="0">
+              <a:rPr lang="en-US" sz="3200" dirty="0">
                 <a:solidFill>
-                  <a:srgbClr val="EAFFC4"/>
+                  <a:srgbClr val="E1FEC2"/>
                 </a:solidFill>
                 <a:latin typeface="Montserrat" pitchFamily="2" charset="0"/>
               </a:rPr>
-              <a:t>	</a:t>
+              <a:t>ABS, 2024; ASIC, 2025</a:t>
             </a:r>
-            <a:r>
-              <a:rPr lang="en-US" sz="4000">
-                <a:solidFill>
-                  <a:srgbClr val="EAFFC4"/>
-                </a:solidFill>
-                <a:latin typeface="Montserrat" pitchFamily="2" charset="0"/>
-              </a:rPr>
-              <a:t>	</a:t>
-            </a:r>
-          </a:p>
-          <a:p>
-            <a:pPr algn="r"/>
-            <a:r>
-              <a:rPr lang="en-US" sz="3600">
-                <a:solidFill>
-                  <a:srgbClr val="EAFFC4"/>
-                </a:solidFill>
-                <a:latin typeface="Montserrat" pitchFamily="2" charset="0"/>
-              </a:rPr>
-              <a:t>(</a:t>
-            </a:r>
-            <a:r>
-              <a:rPr lang="en-US" sz="3600" dirty="0">
-                <a:solidFill>
-                  <a:srgbClr val="EAFFC4"/>
-                </a:solidFill>
-                <a:latin typeface="Montserrat" pitchFamily="2" charset="0"/>
-              </a:rPr>
-              <a:t>ABS, 2024; ASIC, 2025)</a:t>
-            </a:r>
-            <a:endParaRPr lang="en-AU" sz="4000" dirty="0">
+            <a:endParaRPr lang="en-AU" sz="3200" dirty="0">
               <a:solidFill>
-                <a:srgbClr val="EAFFC4"/>
+                <a:srgbClr val="E1FEC2"/>
               </a:solidFill>
               <a:latin typeface="Montserrat" pitchFamily="2" charset="0"/>
             </a:endParaRPr>
@@ -1129,7 +1363,7 @@
           <p:cNvPr id="3" name="TextBox 2">
             <a:extLst>
               <a:ext uri="{FF2B5EF4-FFF2-40B4-BE49-F238E27FC236}">
-                <a16:creationId xmlns:a16="http://schemas.microsoft.com/office/drawing/2014/main" id="{5E32F41B-E3A0-EC50-1D7F-827FE5E32744}"/>
+                <a16:creationId xmlns:a16="http://schemas.microsoft.com/office/drawing/2014/main" id="{6D59E50C-4D11-CD3F-151E-CBFA634433BF}"/>
               </a:ext>
             </a:extLst>
           </p:cNvPr>
@@ -1138,8 +1372,8 @@
         </p:nvSpPr>
         <p:spPr>
           <a:xfrm>
-            <a:off x="1009935" y="2276605"/>
-            <a:ext cx="7219666" cy="4154984"/>
+            <a:off x="2067339" y="1577009"/>
+            <a:ext cx="5062331" cy="369332"/>
           </a:xfrm>
           <a:prstGeom prst="rect">
             <a:avLst/>
@@ -1152,23 +1386,64 @@
           </a:bodyPr>
           <a:lstStyle/>
           <a:p>
-            <a:pPr algn="just"/>
+            <a:endParaRPr lang="en-AU" dirty="0">
+              <a:solidFill>
+                <a:srgbClr val="2D2828"/>
+              </a:solidFill>
+              <a:latin typeface="Montserrat" pitchFamily="2" charset="0"/>
+            </a:endParaRPr>
+          </a:p>
+        </p:txBody>
+      </p:sp>
+      <p:sp>
+        <p:nvSpPr>
+          <p:cNvPr id="4" name="TextBox 3">
+            <a:extLst>
+              <a:ext uri="{FF2B5EF4-FFF2-40B4-BE49-F238E27FC236}">
+                <a16:creationId xmlns:a16="http://schemas.microsoft.com/office/drawing/2014/main" id="{2597DB7A-E8D5-0D37-B02E-05C1EFBDDBE8}"/>
+              </a:ext>
+            </a:extLst>
+          </p:cNvPr>
+          <p:cNvSpPr txBox="1"/>
+          <p:nvPr/>
+        </p:nvSpPr>
+        <p:spPr>
+          <a:xfrm>
+            <a:off x="1736529" y="1755844"/>
+            <a:ext cx="5670941" cy="5632311"/>
+          </a:xfrm>
+          <a:prstGeom prst="rect">
+            <a:avLst/>
+          </a:prstGeom>
+          <a:noFill/>
+        </p:spPr>
+        <p:txBody>
+          <a:bodyPr wrap="square" rtlCol="0">
+            <a:spAutoFit/>
+          </a:bodyPr>
+          <a:lstStyle/>
+          <a:p>
             <a:r>
-              <a:rPr lang="en-US" sz="4400" dirty="0"/>
+              <a:rPr lang="en-US" sz="4000" dirty="0">
+                <a:latin typeface="Montserrat" pitchFamily="2" charset="0"/>
+              </a:rPr>
               <a:t>Almost 48% of new Australian businesses fail within their first four years, and only 77% survive the first 12 months. </a:t>
             </a:r>
           </a:p>
           <a:p>
-            <a:pPr algn="just"/>
-            <a:endParaRPr lang="en-US" sz="4400" dirty="0"/>
+            <a:endParaRPr lang="en-US" sz="4000" dirty="0">
+              <a:latin typeface="Montserrat" pitchFamily="2" charset="0"/>
+            </a:endParaRPr>
           </a:p>
           <a:p>
             <a:pPr algn="r"/>
             <a:r>
-              <a:rPr lang="en-US" sz="4400" dirty="0"/>
-              <a:t>Inside Small Business (2022)</a:t>
+              <a:rPr lang="en-US" sz="4000" dirty="0">
+                <a:latin typeface="Montserrat" pitchFamily="2" charset="0"/>
+              </a:rPr>
+              <a:t>Inside Small Business, 2022</a:t>
             </a:r>
-            <a:endParaRPr lang="en-AU" sz="4400" dirty="0">
+            <a:endParaRPr lang="en-AU" sz="3600" dirty="0">
               <a:solidFill>
                 <a:srgbClr val="2D2828"/>
               </a:solidFill>
@@ -1187,10 +1462,16 @@
 
 <file path=ppt/slides/slide3.xml><?xml version="1.0" encoding="utf-8"?>
 <p:sld xmlns:a="http://schemas.openxmlformats.org/drawingml/2006/main" xmlns:r="http://schemas.openxmlformats.org/officeDocument/2006/relationships" xmlns:p="http://schemas.openxmlformats.org/presentationml/2006/main">
-  <p:cSld name="Slide 3">
+  <p:cSld>
     <p:spTree>
       <p:nvGrpSpPr>
-        <p:cNvPr id="1" name=""/>
+        <p:cNvPr id="1" name="">
+          <a:extLst>
+            <a:ext uri="{FF2B5EF4-FFF2-40B4-BE49-F238E27FC236}">
+              <a16:creationId xmlns:a16="http://schemas.microsoft.com/office/drawing/2014/main" id="{6EC55562-71CC-1A4A-F456-E965FB52363F}"/>
+            </a:ext>
+          </a:extLst>
+        </p:cNvPr>
         <p:cNvGrpSpPr/>
         <p:nvPr/>
       </p:nvGrpSpPr>
@@ -1204,7 +1485,13 @@
       </p:grpSpPr>
       <p:pic>
         <p:nvPicPr>
-          <p:cNvPr id="2" name="Image 0" descr="/home/janek/sova-mvp/instagram-templates/blank_template_dark_watermark.png"/>
+          <p:cNvPr id="2" name="Image 0" descr="/home/janek/sova-mvp/instagram-templates/blank_template_dark.png">
+            <a:extLst>
+              <a:ext uri="{FF2B5EF4-FFF2-40B4-BE49-F238E27FC236}">
+                <a16:creationId xmlns:a16="http://schemas.microsoft.com/office/drawing/2014/main" id="{4FC19FA5-1289-B9F5-EB2C-5BD99B8E285A}"/>
+              </a:ext>
+            </a:extLst>
+          </p:cNvPr>
           <p:cNvPicPr>
             <a:picLocks noChangeAspect="1"/>
           </p:cNvPicPr>
@@ -1228,10 +1515,10 @@
       </p:pic>
       <p:sp>
         <p:nvSpPr>
-          <p:cNvPr id="3" name="TextBox 2">
+          <p:cNvPr id="6" name="TextBox 5">
             <a:extLst>
               <a:ext uri="{FF2B5EF4-FFF2-40B4-BE49-F238E27FC236}">
-                <a16:creationId xmlns:a16="http://schemas.microsoft.com/office/drawing/2014/main" id="{CE04B197-AE71-E891-5959-68C0327127CF}"/>
+                <a16:creationId xmlns:a16="http://schemas.microsoft.com/office/drawing/2014/main" id="{1421FC2D-CC2E-F1FC-927D-4EF78D50A104}"/>
               </a:ext>
             </a:extLst>
           </p:cNvPr>
@@ -1240,8 +1527,8 @@
         </p:nvSpPr>
         <p:spPr>
           <a:xfrm>
-            <a:off x="962167" y="1362204"/>
-            <a:ext cx="7219666" cy="5632311"/>
+            <a:off x="1946882" y="1763370"/>
+            <a:ext cx="5250235" cy="5324535"/>
           </a:xfrm>
           <a:prstGeom prst="rect">
             <a:avLst/>
@@ -1255,19 +1542,19 @@
           <a:lstStyle/>
           <a:p>
             <a:r>
-              <a:rPr lang="en-US" sz="4000" dirty="0">
+              <a:rPr lang="en-US" sz="3400" dirty="0">
                 <a:solidFill>
-                  <a:srgbClr val="EAFFC4"/>
+                  <a:srgbClr val="E1FEC2"/>
                 </a:solidFill>
                 <a:latin typeface="Montserrat" pitchFamily="2" charset="0"/>
               </a:rPr>
-              <a:t>Startup founders need to understand the reasons that startups fail and implement all necessary measures to avoid the pitfalls that most businesses encounter.	</a:t>
+              <a:t>Startup founders need to understand the reasons that startups fail and implement all necessary measures to avoid the pitfalls that most businesses encounter.</a:t>
             </a:r>
           </a:p>
           <a:p>
-            <a:endParaRPr lang="en-US" sz="4000" dirty="0">
+            <a:endParaRPr lang="en-US" sz="3400" dirty="0">
               <a:solidFill>
-                <a:srgbClr val="EAFFC4"/>
+                <a:srgbClr val="E1FEC2"/>
               </a:solidFill>
               <a:latin typeface="Montserrat" pitchFamily="2" charset="0"/>
             </a:endParaRPr>
@@ -1275,9 +1562,9 @@
           <a:p>
             <a:pPr algn="r"/>
             <a:r>
-              <a:rPr lang="en-US" sz="4000" dirty="0">
+              <a:rPr lang="en-US" sz="3400" dirty="0">
                 <a:solidFill>
-                  <a:srgbClr val="EAFFC4"/>
+                  <a:srgbClr val="E1FEC2"/>
                 </a:solidFill>
                 <a:latin typeface="Montserrat" pitchFamily="2" charset="0"/>
               </a:rPr>
@@ -1287,6 +1574,11 @@
         </p:txBody>
       </p:sp>
     </p:spTree>
+    <p:extLst>
+      <p:ext uri="{BB962C8B-B14F-4D97-AF65-F5344CB8AC3E}">
+        <p14:creationId xmlns:p14="http://schemas.microsoft.com/office/powerpoint/2010/main" val="1928952513"/>
+      </p:ext>
+    </p:extLst>
   </p:cSld>
   <p:clrMapOvr>
     <a:masterClrMapping/>
@@ -1297,6 +1589,14 @@
 <file path=ppt/slides/slide4.xml><?xml version="1.0" encoding="utf-8"?>
 <p:sld xmlns:a="http://schemas.openxmlformats.org/drawingml/2006/main" xmlns:r="http://schemas.openxmlformats.org/officeDocument/2006/relationships" xmlns:p="http://schemas.openxmlformats.org/presentationml/2006/main">
   <p:cSld name="Slide 4">
+    <p:bg>
+      <p:bgPr>
+        <a:solidFill>
+          <a:srgbClr val="F5F5DC"/>
+        </a:solidFill>
+        <a:effectLst/>
+      </p:bgPr>
+    </p:bg>
     <p:spTree>
       <p:nvGrpSpPr>
         <p:cNvPr id="1" name=""/>
@@ -1313,22 +1613,24 @@
       </p:grpSpPr>
       <p:pic>
         <p:nvPicPr>
-          <p:cNvPr id="2" name="Image 0" descr="/home/janek/sova-mvp/instagram-templates/blank_template_light_watermark.png"/>
+          <p:cNvPr id="2" name="Image 0" descr="/home/janek/sova-mvp/sova-logo-icon-brown-transparent.png"/>
           <p:cNvPicPr>
             <a:picLocks noChangeAspect="1"/>
           </p:cNvPicPr>
           <p:nvPr/>
         </p:nvPicPr>
         <p:blipFill>
-          <a:blip r:embed="rId3"/>
+          <a:blip r:embed="rId3">
+            <a:alphaModFix amt="25000"/>
+          </a:blip>
           <a:stretch>
             <a:fillRect/>
           </a:stretch>
         </p:blipFill>
         <p:spPr>
           <a:xfrm>
-            <a:off x="0" y="0"/>
-            <a:ext cx="9144000" cy="9144000"/>
+            <a:off x="5384042" y="4408227"/>
+            <a:ext cx="2743200" cy="3566160"/>
           </a:xfrm>
           <a:prstGeom prst="rect">
             <a:avLst/>
@@ -1340,7 +1642,7 @@
           <p:cNvPr id="3" name="TextBox 2">
             <a:extLst>
               <a:ext uri="{FF2B5EF4-FFF2-40B4-BE49-F238E27FC236}">
-                <a16:creationId xmlns:a16="http://schemas.microsoft.com/office/drawing/2014/main" id="{689D2A09-C507-4635-C8DF-BD324FC7A5CE}"/>
+                <a16:creationId xmlns:a16="http://schemas.microsoft.com/office/drawing/2014/main" id="{F6D313A6-7921-BABE-D90B-1803602B6FAA}"/>
               </a:ext>
             </a:extLst>
           </p:cNvPr>
@@ -1349,8 +1651,8 @@
         </p:nvSpPr>
         <p:spPr>
           <a:xfrm>
-            <a:off x="1009935" y="1826227"/>
-            <a:ext cx="7219666" cy="5262979"/>
+            <a:off x="2067339" y="1577009"/>
+            <a:ext cx="5062331" cy="369332"/>
           </a:xfrm>
           <a:prstGeom prst="rect">
             <a:avLst/>
@@ -1363,27 +1665,386 @@
           </a:bodyPr>
           <a:lstStyle/>
           <a:p>
+            <a:endParaRPr lang="en-AU" dirty="0">
+              <a:solidFill>
+                <a:srgbClr val="2D2828"/>
+              </a:solidFill>
+              <a:latin typeface="Montserrat" pitchFamily="2" charset="0"/>
+            </a:endParaRPr>
+          </a:p>
+        </p:txBody>
+      </p:sp>
+      <p:sp>
+        <p:nvSpPr>
+          <p:cNvPr id="4" name="TextBox 3">
+            <a:extLst>
+              <a:ext uri="{FF2B5EF4-FFF2-40B4-BE49-F238E27FC236}">
+                <a16:creationId xmlns:a16="http://schemas.microsoft.com/office/drawing/2014/main" id="{B95825F8-6EC5-5045-1EB4-F5B9A0E71D88}"/>
+              </a:ext>
+            </a:extLst>
+          </p:cNvPr>
+          <p:cNvSpPr txBox="1"/>
+          <p:nvPr/>
+        </p:nvSpPr>
+        <p:spPr>
+          <a:xfrm>
+            <a:off x="1736529" y="832515"/>
+            <a:ext cx="5670941" cy="7478970"/>
+          </a:xfrm>
+          <a:prstGeom prst="rect">
+            <a:avLst/>
+          </a:prstGeom>
+          <a:noFill/>
+        </p:spPr>
+        <p:txBody>
+          <a:bodyPr wrap="square" rtlCol="0">
+            <a:spAutoFit/>
+          </a:bodyPr>
+          <a:lstStyle/>
+          <a:p>
             <a:r>
-              <a:rPr lang="en-US" sz="4800" dirty="0"/>
-              <a:t>With the right approach, you can increase your chances of success despite the odds.	</a:t>
+              <a:rPr lang="en-US" sz="4800" dirty="0">
+                <a:latin typeface="Montserrat" pitchFamily="2" charset="0"/>
+              </a:rPr>
+              <a:t>If you’re launching a business, the odds are against you: Two-thirds of start-ups never show a positive return.	</a:t>
             </a:r>
           </a:p>
           <a:p>
-            <a:endParaRPr lang="en-US" sz="4800" dirty="0"/>
+            <a:endParaRPr lang="en-US" sz="4800" dirty="0">
+              <a:latin typeface="Montserrat" pitchFamily="2" charset="0"/>
+            </a:endParaRPr>
           </a:p>
           <a:p>
             <a:pPr algn="r"/>
             <a:r>
-              <a:rPr lang="en-US" sz="4800" dirty="0"/>
+              <a:rPr lang="en-US" sz="4800" dirty="0">
+                <a:latin typeface="Montserrat" pitchFamily="2" charset="0"/>
+              </a:rPr>
+              <a:t>HBR, 2021</a:t>
+            </a:r>
+          </a:p>
+        </p:txBody>
+      </p:sp>
+    </p:spTree>
+  </p:cSld>
+  <p:clrMapOvr>
+    <a:masterClrMapping/>
+  </p:clrMapOvr>
+</p:sld>
+</file>
+
+<file path=ppt/slides/slide5.xml><?xml version="1.0" encoding="utf-8"?>
+<p:sld xmlns:a="http://schemas.openxmlformats.org/drawingml/2006/main" xmlns:r="http://schemas.openxmlformats.org/officeDocument/2006/relationships" xmlns:p="http://schemas.openxmlformats.org/presentationml/2006/main">
+  <p:cSld name="Slide 3">
+    <p:bg>
+      <p:bgPr>
+        <a:solidFill>
+          <a:srgbClr val="2D2828"/>
+        </a:solidFill>
+        <a:effectLst/>
+      </p:bgPr>
+    </p:bg>
+    <p:spTree>
+      <p:nvGrpSpPr>
+        <p:cNvPr id="1" name=""/>
+        <p:cNvGrpSpPr/>
+        <p:nvPr/>
+      </p:nvGrpSpPr>
+      <p:grpSpPr>
+        <a:xfrm>
+          <a:off x="0" y="0"/>
+          <a:ext cx="0" cy="0"/>
+          <a:chOff x="0" y="0"/>
+          <a:chExt cx="0" cy="0"/>
+        </a:xfrm>
+      </p:grpSpPr>
+      <p:pic>
+        <p:nvPicPr>
+          <p:cNvPr id="2" name="Image 0" descr="/home/janek/sova-mvp/sova-logo-icon-transparent.png"/>
+          <p:cNvPicPr>
+            <a:picLocks noChangeAspect="1"/>
+          </p:cNvPicPr>
+          <p:nvPr/>
+        </p:nvPicPr>
+        <p:blipFill>
+          <a:blip r:embed="rId3">
+            <a:alphaModFix amt="25000"/>
+          </a:blip>
+          <a:stretch>
+            <a:fillRect/>
+          </a:stretch>
+        </p:blipFill>
+        <p:spPr>
+          <a:xfrm>
+            <a:off x="5356747" y="4346813"/>
+            <a:ext cx="2743200" cy="3566160"/>
+          </a:xfrm>
+          <a:prstGeom prst="rect">
+            <a:avLst/>
+          </a:prstGeom>
+        </p:spPr>
+      </p:pic>
+      <p:sp>
+        <p:nvSpPr>
+          <p:cNvPr id="3" name="TextBox 2">
+            <a:extLst>
+              <a:ext uri="{FF2B5EF4-FFF2-40B4-BE49-F238E27FC236}">
+                <a16:creationId xmlns:a16="http://schemas.microsoft.com/office/drawing/2014/main" id="{E26B2064-ABA3-D704-28D1-3B79885DBFDF}"/>
+              </a:ext>
+            </a:extLst>
+          </p:cNvPr>
+          <p:cNvSpPr txBox="1"/>
+          <p:nvPr/>
+        </p:nvSpPr>
+        <p:spPr>
+          <a:xfrm>
+            <a:off x="2067339" y="1577009"/>
+            <a:ext cx="5062331" cy="369332"/>
+          </a:xfrm>
+          <a:prstGeom prst="rect">
+            <a:avLst/>
+          </a:prstGeom>
+          <a:noFill/>
+        </p:spPr>
+        <p:txBody>
+          <a:bodyPr wrap="square" rtlCol="0">
+            <a:spAutoFit/>
+          </a:bodyPr>
+          <a:lstStyle/>
+          <a:p>
+            <a:endParaRPr lang="en-AU" dirty="0">
+              <a:solidFill>
+                <a:srgbClr val="E1FEC2"/>
+              </a:solidFill>
+              <a:latin typeface="Montserrat" pitchFamily="2" charset="0"/>
+            </a:endParaRPr>
+          </a:p>
+        </p:txBody>
+      </p:sp>
+      <p:sp>
+        <p:nvSpPr>
+          <p:cNvPr id="4" name="TextBox 3">
+            <a:extLst>
+              <a:ext uri="{FF2B5EF4-FFF2-40B4-BE49-F238E27FC236}">
+                <a16:creationId xmlns:a16="http://schemas.microsoft.com/office/drawing/2014/main" id="{BC095C37-0F9F-5D06-1167-CB619AEC0457}"/>
+              </a:ext>
+            </a:extLst>
+          </p:cNvPr>
+          <p:cNvSpPr txBox="1"/>
+          <p:nvPr/>
+        </p:nvSpPr>
+        <p:spPr>
+          <a:xfrm>
+            <a:off x="1856787" y="1530657"/>
+            <a:ext cx="5430425" cy="5632311"/>
+          </a:xfrm>
+          <a:prstGeom prst="rect">
+            <a:avLst/>
+          </a:prstGeom>
+          <a:noFill/>
+        </p:spPr>
+        <p:txBody>
+          <a:bodyPr wrap="square" rtlCol="0">
+            <a:spAutoFit/>
+          </a:bodyPr>
+          <a:lstStyle/>
+          <a:p>
+            <a:r>
+              <a:rPr lang="en-US" sz="3600" dirty="0">
+                <a:solidFill>
+                  <a:srgbClr val="E1FEC2"/>
+                </a:solidFill>
+                <a:latin typeface="Montserrat" pitchFamily="2" charset="0"/>
+              </a:rPr>
+              <a:t>Startup founders need to understand the reasons that startups fail and implement all necessary measures to avoid the pitfalls that most businesses encounter.	</a:t>
+            </a:r>
+          </a:p>
+          <a:p>
+            <a:endParaRPr lang="en-US" sz="3600" dirty="0">
+              <a:solidFill>
+                <a:srgbClr val="E1FEC2"/>
+              </a:solidFill>
+              <a:latin typeface="Montserrat" pitchFamily="2" charset="0"/>
+            </a:endParaRPr>
+          </a:p>
+          <a:p>
+            <a:r>
+              <a:rPr lang="en-US" sz="3600" dirty="0">
+                <a:solidFill>
+                  <a:srgbClr val="E1FEC2"/>
+                </a:solidFill>
+                <a:latin typeface="Montserrat" pitchFamily="2" charset="0"/>
+              </a:rPr>
+              <a:t>Exploding Topics, 2025</a:t>
+            </a:r>
+          </a:p>
+        </p:txBody>
+      </p:sp>
+    </p:spTree>
+  </p:cSld>
+  <p:clrMapOvr>
+    <a:masterClrMapping/>
+  </p:clrMapOvr>
+</p:sld>
+</file>
+
+<file path=ppt/slides/slide6.xml><?xml version="1.0" encoding="utf-8"?>
+<p:sld xmlns:a="http://schemas.openxmlformats.org/drawingml/2006/main" xmlns:r="http://schemas.openxmlformats.org/officeDocument/2006/relationships" xmlns:p="http://schemas.openxmlformats.org/presentationml/2006/main">
+  <p:cSld>
+    <p:bg>
+      <p:bgPr>
+        <a:solidFill>
+          <a:srgbClr val="F5F5DC"/>
+        </a:solidFill>
+        <a:effectLst/>
+      </p:bgPr>
+    </p:bg>
+    <p:spTree>
+      <p:nvGrpSpPr>
+        <p:cNvPr id="1" name="">
+          <a:extLst>
+            <a:ext uri="{FF2B5EF4-FFF2-40B4-BE49-F238E27FC236}">
+              <a16:creationId xmlns:a16="http://schemas.microsoft.com/office/drawing/2014/main" id="{2DEA3655-9537-1A3A-F81D-4FF71B02130E}"/>
+            </a:ext>
+          </a:extLst>
+        </p:cNvPr>
+        <p:cNvGrpSpPr/>
+        <p:nvPr/>
+      </p:nvGrpSpPr>
+      <p:grpSpPr>
+        <a:xfrm>
+          <a:off x="0" y="0"/>
+          <a:ext cx="0" cy="0"/>
+          <a:chOff x="0" y="0"/>
+          <a:chExt cx="0" cy="0"/>
+        </a:xfrm>
+      </p:grpSpPr>
+      <p:pic>
+        <p:nvPicPr>
+          <p:cNvPr id="2" name="Image 0" descr="/home/janek/sova-mvp/sova-logo-icon-brown-transparent.png">
+            <a:extLst>
+              <a:ext uri="{FF2B5EF4-FFF2-40B4-BE49-F238E27FC236}">
+                <a16:creationId xmlns:a16="http://schemas.microsoft.com/office/drawing/2014/main" id="{2EA50260-6CA6-8CB3-59DE-6D4DDC4585CA}"/>
+              </a:ext>
+            </a:extLst>
+          </p:cNvPr>
+          <p:cNvPicPr>
+            <a:picLocks noChangeAspect="1"/>
+          </p:cNvPicPr>
+          <p:nvPr/>
+        </p:nvPicPr>
+        <p:blipFill>
+          <a:blip r:embed="rId3">
+            <a:alphaModFix amt="25000"/>
+          </a:blip>
+          <a:stretch>
+            <a:fillRect/>
+          </a:stretch>
+        </p:blipFill>
+        <p:spPr>
+          <a:xfrm>
+            <a:off x="5384042" y="4408227"/>
+            <a:ext cx="2743200" cy="3566160"/>
+          </a:xfrm>
+          <a:prstGeom prst="rect">
+            <a:avLst/>
+          </a:prstGeom>
+        </p:spPr>
+      </p:pic>
+      <p:sp>
+        <p:nvSpPr>
+          <p:cNvPr id="3" name="TextBox 2">
+            <a:extLst>
+              <a:ext uri="{FF2B5EF4-FFF2-40B4-BE49-F238E27FC236}">
+                <a16:creationId xmlns:a16="http://schemas.microsoft.com/office/drawing/2014/main" id="{CCF9952E-664C-ABA4-9397-398B97DA7664}"/>
+              </a:ext>
+            </a:extLst>
+          </p:cNvPr>
+          <p:cNvSpPr txBox="1"/>
+          <p:nvPr/>
+        </p:nvSpPr>
+        <p:spPr>
+          <a:xfrm>
+            <a:off x="2067339" y="1577009"/>
+            <a:ext cx="5062331" cy="369332"/>
+          </a:xfrm>
+          <a:prstGeom prst="rect">
+            <a:avLst/>
+          </a:prstGeom>
+          <a:noFill/>
+        </p:spPr>
+        <p:txBody>
+          <a:bodyPr wrap="square" rtlCol="0">
+            <a:spAutoFit/>
+          </a:bodyPr>
+          <a:lstStyle/>
+          <a:p>
+            <a:endParaRPr lang="en-AU" dirty="0">
+              <a:solidFill>
+                <a:srgbClr val="2D2828"/>
+              </a:solidFill>
+              <a:latin typeface="Montserrat" pitchFamily="2" charset="0"/>
+            </a:endParaRPr>
+          </a:p>
+        </p:txBody>
+      </p:sp>
+      <p:sp>
+        <p:nvSpPr>
+          <p:cNvPr id="4" name="TextBox 3">
+            <a:extLst>
+              <a:ext uri="{FF2B5EF4-FFF2-40B4-BE49-F238E27FC236}">
+                <a16:creationId xmlns:a16="http://schemas.microsoft.com/office/drawing/2014/main" id="{543281EB-4D1A-2C5B-3F87-AADAA1C9407B}"/>
+              </a:ext>
+            </a:extLst>
+          </p:cNvPr>
+          <p:cNvSpPr txBox="1"/>
+          <p:nvPr/>
+        </p:nvSpPr>
+        <p:spPr>
+          <a:xfrm>
+            <a:off x="1763033" y="1017180"/>
+            <a:ext cx="5670941" cy="7109639"/>
+          </a:xfrm>
+          <a:prstGeom prst="rect">
+            <a:avLst/>
+          </a:prstGeom>
+          <a:noFill/>
+        </p:spPr>
+        <p:txBody>
+          <a:bodyPr wrap="square" rtlCol="0">
+            <a:spAutoFit/>
+          </a:bodyPr>
+          <a:lstStyle/>
+          <a:p>
+            <a:r>
+              <a:rPr lang="en-US" sz="3800" dirty="0">
+                <a:latin typeface="Montserrat" pitchFamily="2" charset="0"/>
+              </a:rPr>
+              <a:t>By understanding common pitfalls and having a plan in place for how to mitigate them, entrepreneurs can increase their chances of creating successful businesses and reaching their goals.	</a:t>
+            </a:r>
+          </a:p>
+          <a:p>
+            <a:endParaRPr lang="en-US" sz="3800" dirty="0">
+              <a:latin typeface="Montserrat" pitchFamily="2" charset="0"/>
+            </a:endParaRPr>
+          </a:p>
+          <a:p>
+            <a:pPr algn="r"/>
+            <a:r>
+              <a:rPr lang="en-US" sz="3800" dirty="0">
+                <a:latin typeface="Montserrat" pitchFamily="2" charset="0"/>
+              </a:rPr>
               <a:t>HubSpot, 2023</a:t>
             </a:r>
           </a:p>
-          <a:p>
-            <a:endParaRPr lang="en-US" sz="4800" dirty="0"/>
-          </a:p>
         </p:txBody>
       </p:sp>
     </p:spTree>
+    <p:extLst>
+      <p:ext uri="{BB962C8B-B14F-4D97-AF65-F5344CB8AC3E}">
+        <p14:creationId xmlns:p14="http://schemas.microsoft.com/office/powerpoint/2010/main" val="1457053387"/>
+      </p:ext>
+    </p:extLst>
   </p:cSld>
   <p:clrMapOvr>
     <a:masterClrMapping/>

</xml_diff>